<commit_message>
:pencil: Revised training content
</commit_message>
<xml_diff>
--- a/training/thumbnail.Slide.pptx
+++ b/training/thumbnail.Slide.pptx
@@ -206,7 +206,7 @@
 <file path=ppt/revisionInfo.xml><?xml version="1.0" encoding="utf-8"?>
 <p1510:revInfo xmlns:a="http://schemas.openxmlformats.org/drawingml/2006/main" xmlns:r="http://schemas.openxmlformats.org/officeDocument/2006/relationships" xmlns:p1510="http://schemas.microsoft.com/office/powerpoint/2015/10/main">
   <p1510:revLst>
-    <p1510:client id="{0F140BD5-7A91-4508-BA25-C1A3FC4DEFB8}" v="1" dt="2019-03-14T11:03:33.075"/>
+    <p1510:client id="{0F140BD5-7A91-4508-BA25-C1A3FC4DEFB8}" v="2" dt="2019-03-14T11:26:28.995"/>
   </p1510:revLst>
 </p1510:revInfo>
 </file>
@@ -216,24 +216,32 @@
   <pc:docChgLst>
     <pc:chgData name="David Stevens" userId="73fe415a-d21a-4898-bfab-0e75d37181d7" providerId="ADAL" clId="{0F140BD5-7A91-4508-BA25-C1A3FC4DEFB8}"/>
     <pc:docChg chg="undo custSel modSld">
-      <pc:chgData name="David Stevens" userId="73fe415a-d21a-4898-bfab-0e75d37181d7" providerId="ADAL" clId="{0F140BD5-7A91-4508-BA25-C1A3FC4DEFB8}" dt="2019-03-14T11:03:38.767" v="7" actId="167"/>
+      <pc:chgData name="David Stevens" userId="73fe415a-d21a-4898-bfab-0e75d37181d7" providerId="ADAL" clId="{0F140BD5-7A91-4508-BA25-C1A3FC4DEFB8}" dt="2019-03-14T11:26:35.372" v="13" actId="167"/>
       <pc:docMkLst>
         <pc:docMk/>
       </pc:docMkLst>
       <pc:sldChg chg="addSp delSp modSp">
-        <pc:chgData name="David Stevens" userId="73fe415a-d21a-4898-bfab-0e75d37181d7" providerId="ADAL" clId="{0F140BD5-7A91-4508-BA25-C1A3FC4DEFB8}" dt="2019-03-14T11:03:38.767" v="7" actId="167"/>
+        <pc:chgData name="David Stevens" userId="73fe415a-d21a-4898-bfab-0e75d37181d7" providerId="ADAL" clId="{0F140BD5-7A91-4508-BA25-C1A3FC4DEFB8}" dt="2019-03-14T11:26:35.372" v="13" actId="167"/>
         <pc:sldMkLst>
           <pc:docMk/>
           <pc:sldMk cId="2326808822" sldId="256"/>
         </pc:sldMkLst>
         <pc:spChg chg="add del ord">
-          <ac:chgData name="David Stevens" userId="73fe415a-d21a-4898-bfab-0e75d37181d7" providerId="ADAL" clId="{0F140BD5-7A91-4508-BA25-C1A3FC4DEFB8}" dt="2019-03-14T11:02:01.096" v="2" actId="171"/>
+          <ac:chgData name="David Stevens" userId="73fe415a-d21a-4898-bfab-0e75d37181d7" providerId="ADAL" clId="{0F140BD5-7A91-4508-BA25-C1A3FC4DEFB8}" dt="2019-03-14T11:26:27.081" v="8" actId="167"/>
           <ac:spMkLst>
             <pc:docMk/>
             <pc:sldMk cId="2326808822" sldId="256"/>
             <ac:spMk id="10" creationId="{A8CB3075-88F6-481B-AFB3-663519EB4508}"/>
           </ac:spMkLst>
         </pc:spChg>
+        <pc:picChg chg="add mod ord">
+          <ac:chgData name="David Stevens" userId="73fe415a-d21a-4898-bfab-0e75d37181d7" providerId="ADAL" clId="{0F140BD5-7A91-4508-BA25-C1A3FC4DEFB8}" dt="2019-03-14T11:26:35.372" v="13" actId="167"/>
+          <ac:picMkLst>
+            <pc:docMk/>
+            <pc:sldMk cId="2326808822" sldId="256"/>
+            <ac:picMk id="2" creationId="{EBD04760-563C-42D7-A3A2-882412823F6A}"/>
+          </ac:picMkLst>
+        </pc:picChg>
         <pc:picChg chg="del">
           <ac:chgData name="David Stevens" userId="73fe415a-d21a-4898-bfab-0e75d37181d7" providerId="ADAL" clId="{0F140BD5-7A91-4508-BA25-C1A3FC4DEFB8}" dt="2019-03-14T11:02:02.375" v="3" actId="478"/>
           <ac:picMkLst>
@@ -242,8 +250,8 @@
             <ac:picMk id="9" creationId="{7D79C299-F467-4E61-A704-1281EEAB7202}"/>
           </ac:picMkLst>
         </pc:picChg>
-        <pc:picChg chg="add mod ord">
-          <ac:chgData name="David Stevens" userId="73fe415a-d21a-4898-bfab-0e75d37181d7" providerId="ADAL" clId="{0F140BD5-7A91-4508-BA25-C1A3FC4DEFB8}" dt="2019-03-14T11:03:38.767" v="7" actId="167"/>
+        <pc:picChg chg="add del mod ord">
+          <ac:chgData name="David Stevens" userId="73fe415a-d21a-4898-bfab-0e75d37181d7" providerId="ADAL" clId="{0F140BD5-7A91-4508-BA25-C1A3FC4DEFB8}" dt="2019-03-14T11:26:27.988" v="9" actId="478"/>
           <ac:picMkLst>
             <pc:docMk/>
             <pc:sldMk cId="2326808822" sldId="256"/>
@@ -33036,10 +33044,10 @@
       </p:grpSpPr>
       <p:pic>
         <p:nvPicPr>
-          <p:cNvPr id="11" name="Picture 10">
+          <p:cNvPr id="2" name="Picture 1">
             <a:extLst>
               <a:ext uri="{FF2B5EF4-FFF2-40B4-BE49-F238E27FC236}">
-                <a16:creationId xmlns:a16="http://schemas.microsoft.com/office/drawing/2014/main" id="{10A43974-E36A-4ABD-BF77-B5CE0C2CA474}"/>
+                <a16:creationId xmlns:a16="http://schemas.microsoft.com/office/drawing/2014/main" id="{EBD04760-563C-42D7-A3A2-882412823F6A}"/>
               </a:ext>
             </a:extLst>
           </p:cNvPr>
@@ -33056,8 +33064,8 @@
         </p:blipFill>
         <p:spPr>
           <a:xfrm>
-            <a:off x="2586313" y="1337188"/>
-            <a:ext cx="9472279" cy="5429593"/>
+            <a:off x="2571807" y="1401171"/>
+            <a:ext cx="9394051" cy="5374204"/>
           </a:xfrm>
           <a:prstGeom prst="rect">
             <a:avLst/>

</xml_diff>